<commit_message>
Homework A. Reservoir Sampling Applied.
</commit_message>
<xml_diff>
--- a/00 개별과제.pptx
+++ b/00 개별과제.pptx
@@ -2343,11 +2343,11 @@
               <a:t>, </a:t>
             </a:r>
             <a:r>
-              <a:rPr lang="ko-KR" altLang="en-US"/>
+              <a:rPr lang="ko-KR" altLang="en-US" dirty="0"/>
               <a:t>소셜미디어 스트림 등</a:t>
             </a:r>
             <a:r>
-              <a:rPr lang="en-US" altLang="ko-KR"/>
+              <a:rPr lang="en-US" altLang="ko-KR" dirty="0"/>
               <a:t>)</a:t>
             </a:r>
             <a:r>

</xml_diff>

<commit_message>
Homework C. Watermark + Sliding Window Applied.
</commit_message>
<xml_diff>
--- a/00 개별과제.pptx
+++ b/00 개별과제.pptx
@@ -215,7 +215,7 @@
           <a:p>
             <a:fld id="{A3661A17-B369-40A6-BAD3-08D18F542D5C}" type="datetimeFigureOut">
               <a:rPr lang="ko-KR" altLang="en-US" smtClean="0"/>
-              <a:t>2025-11-06</a:t>
+              <a:t>2025-11-07</a:t>
             </a:fld>
             <a:endParaRPr lang="ko-KR" altLang="en-US"/>
           </a:p>
@@ -3004,7 +3004,11 @@
             </a:r>
             <a:r>
               <a:rPr lang="ko-KR" altLang="en-US" dirty="0"/>
-              <a:t>정확한 중복 제</a:t>
+              <a:t>정확한 </a:t>
+            </a:r>
+            <a:r>
+              <a:rPr lang="ko-KR" altLang="en-US"/>
+              <a:t>중복 제거</a:t>
             </a:r>
             <a:endParaRPr lang="en-US" altLang="ko-KR" dirty="0"/>
           </a:p>

</xml_diff>

<commit_message>
Homework D, E. FM algorithm + PDF/CDF labeling applied.
</commit_message>
<xml_diff>
--- a/00 개별과제.pptx
+++ b/00 개별과제.pptx
@@ -3004,11 +3004,7 @@
             </a:r>
             <a:r>
               <a:rPr lang="ko-KR" altLang="en-US" dirty="0"/>
-              <a:t>정확한 </a:t>
-            </a:r>
-            <a:r>
-              <a:rPr lang="ko-KR" altLang="en-US"/>
-              <a:t>중복 제거</a:t>
+              <a:t>정확한 중복 제거</a:t>
             </a:r>
             <a:endParaRPr lang="en-US" altLang="ko-KR" dirty="0"/>
           </a:p>

</xml_diff>